<commit_message>
Added readout during the procedure
</commit_message>
<xml_diff>
--- a/SantaCode_2014_StJohn.pptx
+++ b/SantaCode_2014_StJohn.pptx
@@ -1083,6 +1083,13 @@
         </dgm:presLayoutVars>
       </dgm:prSet>
       <dgm:spPr/>
+      <dgm:t>
+        <a:bodyPr/>
+        <a:lstStyle/>
+        <a:p>
+          <a:endParaRPr lang="en-US"/>
+        </a:p>
+      </dgm:t>
     </dgm:pt>
     <dgm:pt modelId="{E00B80AF-3018-0D47-8A6C-90FDE4E59CC9}" type="pres">
       <dgm:prSet presAssocID="{9A2F1BB1-3F12-0A49-9298-42D4065FDDED}" presName="boxAndChildren" presStyleCnt="0"/>
@@ -1110,6 +1117,13 @@
     <dgm:pt modelId="{E5CDFFE8-7BD3-8A4D-8ABD-3F2C80AF2488}" type="pres">
       <dgm:prSet presAssocID="{BC07BA80-53E6-7143-81BF-1CCFB25CFC4B}" presName="parentTextArrow" presStyleLbl="node1" presStyleIdx="1" presStyleCnt="5"/>
       <dgm:spPr/>
+      <dgm:t>
+        <a:bodyPr/>
+        <a:lstStyle/>
+        <a:p>
+          <a:endParaRPr lang="en-US"/>
+        </a:p>
+      </dgm:t>
     </dgm:pt>
     <dgm:pt modelId="{78549FA4-75BB-3B48-842F-290DF7E176D7}" type="pres">
       <dgm:prSet presAssocID="{9B55CD89-71FF-E141-AA10-17B0CDE23359}" presName="sp" presStyleCnt="0"/>
@@ -1122,6 +1136,13 @@
     <dgm:pt modelId="{80037826-CAF3-B546-9905-AAA3A59C4396}" type="pres">
       <dgm:prSet presAssocID="{9BE7DA08-2693-904A-BF29-790B3E7117A4}" presName="parentTextArrow" presStyleLbl="node1" presStyleIdx="2" presStyleCnt="5"/>
       <dgm:spPr/>
+      <dgm:t>
+        <a:bodyPr/>
+        <a:lstStyle/>
+        <a:p>
+          <a:endParaRPr lang="en-US"/>
+        </a:p>
+      </dgm:t>
     </dgm:pt>
     <dgm:pt modelId="{01A30C68-7DF4-4E43-A7BB-573B87A31CB4}" type="pres">
       <dgm:prSet presAssocID="{419758D3-4EB1-1042-82E7-7AD2C82BBA94}" presName="sp" presStyleCnt="0"/>
@@ -1134,6 +1155,13 @@
     <dgm:pt modelId="{8FFE8A4B-8D45-EC40-A266-14CB744DFE4D}" type="pres">
       <dgm:prSet presAssocID="{7C87644E-F0D1-6F46-A4E1-A62BE0EA524B}" presName="parentTextArrow" presStyleLbl="node1" presStyleIdx="3" presStyleCnt="5"/>
       <dgm:spPr/>
+      <dgm:t>
+        <a:bodyPr/>
+        <a:lstStyle/>
+        <a:p>
+          <a:endParaRPr lang="en-US"/>
+        </a:p>
+      </dgm:t>
     </dgm:pt>
     <dgm:pt modelId="{9B95AE5C-95AA-FB4A-90BE-8EE3C5152FE5}" type="pres">
       <dgm:prSet presAssocID="{14833A19-3936-D741-899B-2E7DBAEAF241}" presName="sp" presStyleCnt="0"/>
@@ -6536,6 +6564,124 @@
           </a:p>
         </p:txBody>
       </p:sp>
+      <p:sp>
+        <p:nvSpPr>
+          <p:cNvPr id="9" name="TextBox 8"/>
+          <p:cNvSpPr txBox="1"/>
+          <p:nvPr/>
+        </p:nvSpPr>
+        <p:spPr>
+          <a:xfrm>
+            <a:off x="4391268" y="5421921"/>
+            <a:ext cx="4752731" cy="923330"/>
+          </a:xfrm>
+          <a:prstGeom prst="rect">
+            <a:avLst/>
+          </a:prstGeom>
+          <a:noFill/>
+        </p:spPr>
+        <p:txBody>
+          <a:bodyPr wrap="square" rtlCol="0">
+            <a:spAutoFit/>
+          </a:bodyPr>
+          <a:lstStyle/>
+          <a:p>
+            <a:r>
+              <a:rPr lang="en-US" dirty="0" smtClean="0"/>
+              <a:t>Fits in Art-Board:</a:t>
+            </a:r>
+          </a:p>
+          <a:p>
+            <a:r>
+              <a:rPr lang="en-US" dirty="0" smtClean="0"/>
+              <a:t>No Collisions:</a:t>
+            </a:r>
+          </a:p>
+          <a:p>
+            <a:r>
+              <a:rPr lang="en-US" dirty="0" smtClean="0"/>
+              <a:t>Placed Items: Square, Trapezoid, Circle </a:t>
+            </a:r>
+            <a:endParaRPr lang="en-US" dirty="0"/>
+          </a:p>
+        </p:txBody>
+      </p:sp>
+      <p:sp>
+        <p:nvSpPr>
+          <p:cNvPr id="12" name="Oval 11"/>
+          <p:cNvSpPr/>
+          <p:nvPr/>
+        </p:nvSpPr>
+        <p:spPr>
+          <a:xfrm>
+            <a:off x="6208345" y="5812689"/>
+            <a:ext cx="185617" cy="185617"/>
+          </a:xfrm>
+          <a:prstGeom prst="ellipse">
+            <a:avLst/>
+          </a:prstGeom>
+        </p:spPr>
+        <p:style>
+          <a:lnRef idx="1">
+            <a:schemeClr val="accent3"/>
+          </a:lnRef>
+          <a:fillRef idx="3">
+            <a:schemeClr val="accent3"/>
+          </a:fillRef>
+          <a:effectRef idx="2">
+            <a:schemeClr val="accent3"/>
+          </a:effectRef>
+          <a:fontRef idx="minor">
+            <a:schemeClr val="lt1"/>
+          </a:fontRef>
+        </p:style>
+        <p:txBody>
+          <a:bodyPr rtlCol="0" anchor="ctr"/>
+          <a:lstStyle/>
+          <a:p>
+            <a:pPr algn="ctr"/>
+            <a:endParaRPr lang="en-US"/>
+          </a:p>
+        </p:txBody>
+      </p:sp>
+      <p:sp>
+        <p:nvSpPr>
+          <p:cNvPr id="13" name="Oval 12"/>
+          <p:cNvSpPr/>
+          <p:nvPr/>
+        </p:nvSpPr>
+        <p:spPr>
+          <a:xfrm>
+            <a:off x="6208345" y="5509844"/>
+            <a:ext cx="185617" cy="185617"/>
+          </a:xfrm>
+          <a:prstGeom prst="ellipse">
+            <a:avLst/>
+          </a:prstGeom>
+        </p:spPr>
+        <p:style>
+          <a:lnRef idx="1">
+            <a:schemeClr val="accent3"/>
+          </a:lnRef>
+          <a:fillRef idx="3">
+            <a:schemeClr val="accent3"/>
+          </a:fillRef>
+          <a:effectRef idx="2">
+            <a:schemeClr val="accent3"/>
+          </a:effectRef>
+          <a:fontRef idx="minor">
+            <a:schemeClr val="lt1"/>
+          </a:fontRef>
+        </p:style>
+        <p:txBody>
+          <a:bodyPr rtlCol="0" anchor="ctr"/>
+          <a:lstStyle/>
+          <a:p>
+            <a:pPr algn="ctr"/>
+            <a:endParaRPr lang="en-US"/>
+          </a:p>
+        </p:txBody>
+      </p:sp>
     </p:spTree>
     <p:extLst>
       <p:ext uri="{BB962C8B-B14F-4D97-AF65-F5344CB8AC3E}">
@@ -6924,6 +7070,124 @@
           </a:p>
         </p:txBody>
       </p:sp>
+      <p:sp>
+        <p:nvSpPr>
+          <p:cNvPr id="14" name="TextBox 13"/>
+          <p:cNvSpPr txBox="1"/>
+          <p:nvPr/>
+        </p:nvSpPr>
+        <p:spPr>
+          <a:xfrm>
+            <a:off x="4391268" y="5421921"/>
+            <a:ext cx="4752731" cy="923330"/>
+          </a:xfrm>
+          <a:prstGeom prst="rect">
+            <a:avLst/>
+          </a:prstGeom>
+          <a:noFill/>
+        </p:spPr>
+        <p:txBody>
+          <a:bodyPr wrap="square" rtlCol="0">
+            <a:spAutoFit/>
+          </a:bodyPr>
+          <a:lstStyle/>
+          <a:p>
+            <a:r>
+              <a:rPr lang="en-US" dirty="0" smtClean="0"/>
+              <a:t>Fits in Art-Board:</a:t>
+            </a:r>
+          </a:p>
+          <a:p>
+            <a:r>
+              <a:rPr lang="en-US" dirty="0" smtClean="0"/>
+              <a:t>No Collisions:</a:t>
+            </a:r>
+          </a:p>
+          <a:p>
+            <a:r>
+              <a:rPr lang="en-US" dirty="0" smtClean="0"/>
+              <a:t>Placed Items: Square, Trapezoid, Circle </a:t>
+            </a:r>
+            <a:endParaRPr lang="en-US" dirty="0"/>
+          </a:p>
+        </p:txBody>
+      </p:sp>
+      <p:sp>
+        <p:nvSpPr>
+          <p:cNvPr id="15" name="Oval 14"/>
+          <p:cNvSpPr/>
+          <p:nvPr/>
+        </p:nvSpPr>
+        <p:spPr>
+          <a:xfrm>
+            <a:off x="6208345" y="5812689"/>
+            <a:ext cx="185617" cy="185617"/>
+          </a:xfrm>
+          <a:prstGeom prst="ellipse">
+            <a:avLst/>
+          </a:prstGeom>
+        </p:spPr>
+        <p:style>
+          <a:lnRef idx="1">
+            <a:schemeClr val="dk1"/>
+          </a:lnRef>
+          <a:fillRef idx="3">
+            <a:schemeClr val="dk1"/>
+          </a:fillRef>
+          <a:effectRef idx="2">
+            <a:schemeClr val="dk1"/>
+          </a:effectRef>
+          <a:fontRef idx="minor">
+            <a:schemeClr val="lt1"/>
+          </a:fontRef>
+        </p:style>
+        <p:txBody>
+          <a:bodyPr rtlCol="0" anchor="ctr"/>
+          <a:lstStyle/>
+          <a:p>
+            <a:pPr algn="ctr"/>
+            <a:endParaRPr lang="en-US"/>
+          </a:p>
+        </p:txBody>
+      </p:sp>
+      <p:sp>
+        <p:nvSpPr>
+          <p:cNvPr id="16" name="Oval 15"/>
+          <p:cNvSpPr/>
+          <p:nvPr/>
+        </p:nvSpPr>
+        <p:spPr>
+          <a:xfrm>
+            <a:off x="6208345" y="5509844"/>
+            <a:ext cx="185617" cy="185617"/>
+          </a:xfrm>
+          <a:prstGeom prst="ellipse">
+            <a:avLst/>
+          </a:prstGeom>
+        </p:spPr>
+        <p:style>
+          <a:lnRef idx="1">
+            <a:schemeClr val="accent2"/>
+          </a:lnRef>
+          <a:fillRef idx="3">
+            <a:schemeClr val="accent2"/>
+          </a:fillRef>
+          <a:effectRef idx="2">
+            <a:schemeClr val="accent2"/>
+          </a:effectRef>
+          <a:fontRef idx="minor">
+            <a:schemeClr val="lt1"/>
+          </a:fontRef>
+        </p:style>
+        <p:txBody>
+          <a:bodyPr rtlCol="0" anchor="ctr"/>
+          <a:lstStyle/>
+          <a:p>
+            <a:pPr algn="ctr"/>
+            <a:endParaRPr lang="en-US"/>
+          </a:p>
+        </p:txBody>
+      </p:sp>
     </p:spTree>
     <p:extLst>
       <p:ext uri="{BB962C8B-B14F-4D97-AF65-F5344CB8AC3E}">
@@ -7228,7 +7492,6 @@
               <a:rPr lang="en-US" sz="3200" dirty="0"/>
               <a:t>2</a:t>
             </a:r>
-            <a:endParaRPr lang="en-US" sz="3200" dirty="0"/>
           </a:p>
         </p:txBody>
       </p:sp>
@@ -7309,6 +7572,124 @@
               <a:t>1.0492</a:t>
             </a:r>
             <a:endParaRPr lang="en-US" dirty="0"/>
+          </a:p>
+        </p:txBody>
+      </p:sp>
+      <p:sp>
+        <p:nvSpPr>
+          <p:cNvPr id="12" name="TextBox 11"/>
+          <p:cNvSpPr txBox="1"/>
+          <p:nvPr/>
+        </p:nvSpPr>
+        <p:spPr>
+          <a:xfrm>
+            <a:off x="4391268" y="5421921"/>
+            <a:ext cx="4752731" cy="923330"/>
+          </a:xfrm>
+          <a:prstGeom prst="rect">
+            <a:avLst/>
+          </a:prstGeom>
+          <a:noFill/>
+        </p:spPr>
+        <p:txBody>
+          <a:bodyPr wrap="square" rtlCol="0">
+            <a:spAutoFit/>
+          </a:bodyPr>
+          <a:lstStyle/>
+          <a:p>
+            <a:r>
+              <a:rPr lang="en-US" dirty="0" smtClean="0"/>
+              <a:t>Fits in Art-Board:</a:t>
+            </a:r>
+          </a:p>
+          <a:p>
+            <a:r>
+              <a:rPr lang="en-US" dirty="0" smtClean="0"/>
+              <a:t>No Collisions:</a:t>
+            </a:r>
+          </a:p>
+          <a:p>
+            <a:r>
+              <a:rPr lang="en-US" dirty="0" smtClean="0"/>
+              <a:t>Placed Items: Square, Trapezoid, Circle </a:t>
+            </a:r>
+            <a:endParaRPr lang="en-US" dirty="0"/>
+          </a:p>
+        </p:txBody>
+      </p:sp>
+      <p:sp>
+        <p:nvSpPr>
+          <p:cNvPr id="13" name="Oval 12"/>
+          <p:cNvSpPr/>
+          <p:nvPr/>
+        </p:nvSpPr>
+        <p:spPr>
+          <a:xfrm>
+            <a:off x="6208345" y="5812689"/>
+            <a:ext cx="185617" cy="185617"/>
+          </a:xfrm>
+          <a:prstGeom prst="ellipse">
+            <a:avLst/>
+          </a:prstGeom>
+        </p:spPr>
+        <p:style>
+          <a:lnRef idx="1">
+            <a:schemeClr val="dk1"/>
+          </a:lnRef>
+          <a:fillRef idx="3">
+            <a:schemeClr val="dk1"/>
+          </a:fillRef>
+          <a:effectRef idx="2">
+            <a:schemeClr val="dk1"/>
+          </a:effectRef>
+          <a:fontRef idx="minor">
+            <a:schemeClr val="lt1"/>
+          </a:fontRef>
+        </p:style>
+        <p:txBody>
+          <a:bodyPr rtlCol="0" anchor="ctr"/>
+          <a:lstStyle/>
+          <a:p>
+            <a:pPr algn="ctr"/>
+            <a:endParaRPr lang="en-US"/>
+          </a:p>
+        </p:txBody>
+      </p:sp>
+      <p:sp>
+        <p:nvSpPr>
+          <p:cNvPr id="14" name="Oval 13"/>
+          <p:cNvSpPr/>
+          <p:nvPr/>
+        </p:nvSpPr>
+        <p:spPr>
+          <a:xfrm>
+            <a:off x="6208345" y="5509844"/>
+            <a:ext cx="185617" cy="185617"/>
+          </a:xfrm>
+          <a:prstGeom prst="ellipse">
+            <a:avLst/>
+          </a:prstGeom>
+        </p:spPr>
+        <p:style>
+          <a:lnRef idx="1">
+            <a:schemeClr val="accent2"/>
+          </a:lnRef>
+          <a:fillRef idx="3">
+            <a:schemeClr val="accent2"/>
+          </a:fillRef>
+          <a:effectRef idx="2">
+            <a:schemeClr val="accent2"/>
+          </a:effectRef>
+          <a:fontRef idx="minor">
+            <a:schemeClr val="lt1"/>
+          </a:fontRef>
+        </p:style>
+        <p:txBody>
+          <a:bodyPr rtlCol="0" anchor="ctr"/>
+          <a:lstStyle/>
+          <a:p>
+            <a:pPr algn="ctr"/>
+            <a:endParaRPr lang="en-US"/>
           </a:p>
         </p:txBody>
       </p:sp>
@@ -7616,7 +7997,6 @@
               <a:rPr lang="en-US" sz="3200" dirty="0"/>
               <a:t>3</a:t>
             </a:r>
-            <a:endParaRPr lang="en-US" sz="3200" dirty="0"/>
           </a:p>
         </p:txBody>
       </p:sp>
@@ -7697,6 +8077,124 @@
               <a:t>1.0492</a:t>
             </a:r>
             <a:endParaRPr lang="en-US" dirty="0"/>
+          </a:p>
+        </p:txBody>
+      </p:sp>
+      <p:sp>
+        <p:nvSpPr>
+          <p:cNvPr id="12" name="TextBox 11"/>
+          <p:cNvSpPr txBox="1"/>
+          <p:nvPr/>
+        </p:nvSpPr>
+        <p:spPr>
+          <a:xfrm>
+            <a:off x="4391268" y="5421921"/>
+            <a:ext cx="4752731" cy="923330"/>
+          </a:xfrm>
+          <a:prstGeom prst="rect">
+            <a:avLst/>
+          </a:prstGeom>
+          <a:noFill/>
+        </p:spPr>
+        <p:txBody>
+          <a:bodyPr wrap="square" rtlCol="0">
+            <a:spAutoFit/>
+          </a:bodyPr>
+          <a:lstStyle/>
+          <a:p>
+            <a:r>
+              <a:rPr lang="en-US" dirty="0" smtClean="0"/>
+              <a:t>Fits in Art-Board:</a:t>
+            </a:r>
+          </a:p>
+          <a:p>
+            <a:r>
+              <a:rPr lang="en-US" dirty="0" smtClean="0"/>
+              <a:t>No Collisions:</a:t>
+            </a:r>
+          </a:p>
+          <a:p>
+            <a:r>
+              <a:rPr lang="en-US" dirty="0" smtClean="0"/>
+              <a:t>Placed Items: Square, Trapezoid, Circle </a:t>
+            </a:r>
+            <a:endParaRPr lang="en-US" dirty="0"/>
+          </a:p>
+        </p:txBody>
+      </p:sp>
+      <p:sp>
+        <p:nvSpPr>
+          <p:cNvPr id="13" name="Oval 12"/>
+          <p:cNvSpPr/>
+          <p:nvPr/>
+        </p:nvSpPr>
+        <p:spPr>
+          <a:xfrm>
+            <a:off x="6208345" y="5812689"/>
+            <a:ext cx="185617" cy="185617"/>
+          </a:xfrm>
+          <a:prstGeom prst="ellipse">
+            <a:avLst/>
+          </a:prstGeom>
+        </p:spPr>
+        <p:style>
+          <a:lnRef idx="1">
+            <a:schemeClr val="accent2"/>
+          </a:lnRef>
+          <a:fillRef idx="3">
+            <a:schemeClr val="accent2"/>
+          </a:fillRef>
+          <a:effectRef idx="2">
+            <a:schemeClr val="accent2"/>
+          </a:effectRef>
+          <a:fontRef idx="minor">
+            <a:schemeClr val="lt1"/>
+          </a:fontRef>
+        </p:style>
+        <p:txBody>
+          <a:bodyPr rtlCol="0" anchor="ctr"/>
+          <a:lstStyle/>
+          <a:p>
+            <a:pPr algn="ctr"/>
+            <a:endParaRPr lang="en-US"/>
+          </a:p>
+        </p:txBody>
+      </p:sp>
+      <p:sp>
+        <p:nvSpPr>
+          <p:cNvPr id="14" name="Oval 13"/>
+          <p:cNvSpPr/>
+          <p:nvPr/>
+        </p:nvSpPr>
+        <p:spPr>
+          <a:xfrm>
+            <a:off x="6208345" y="5509844"/>
+            <a:ext cx="185617" cy="185617"/>
+          </a:xfrm>
+          <a:prstGeom prst="ellipse">
+            <a:avLst/>
+          </a:prstGeom>
+        </p:spPr>
+        <p:style>
+          <a:lnRef idx="1">
+            <a:schemeClr val="accent3"/>
+          </a:lnRef>
+          <a:fillRef idx="3">
+            <a:schemeClr val="accent3"/>
+          </a:fillRef>
+          <a:effectRef idx="2">
+            <a:schemeClr val="accent3"/>
+          </a:effectRef>
+          <a:fontRef idx="minor">
+            <a:schemeClr val="lt1"/>
+          </a:fontRef>
+        </p:style>
+        <p:txBody>
+          <a:bodyPr rtlCol="0" anchor="ctr"/>
+          <a:lstStyle/>
+          <a:p>
+            <a:pPr algn="ctr"/>
+            <a:endParaRPr lang="en-US"/>
           </a:p>
         </p:txBody>
       </p:sp>
@@ -8004,7 +8502,6 @@
               <a:rPr lang="en-US" sz="3200" dirty="0"/>
               <a:t>4</a:t>
             </a:r>
-            <a:endParaRPr lang="en-US" sz="3200" dirty="0"/>
           </a:p>
         </p:txBody>
       </p:sp>
@@ -8085,6 +8582,124 @@
               <a:t>1.0492</a:t>
             </a:r>
             <a:endParaRPr lang="en-US" dirty="0"/>
+          </a:p>
+        </p:txBody>
+      </p:sp>
+      <p:sp>
+        <p:nvSpPr>
+          <p:cNvPr id="12" name="TextBox 11"/>
+          <p:cNvSpPr txBox="1"/>
+          <p:nvPr/>
+        </p:nvSpPr>
+        <p:spPr>
+          <a:xfrm>
+            <a:off x="4391268" y="5421921"/>
+            <a:ext cx="4752731" cy="923330"/>
+          </a:xfrm>
+          <a:prstGeom prst="rect">
+            <a:avLst/>
+          </a:prstGeom>
+          <a:noFill/>
+        </p:spPr>
+        <p:txBody>
+          <a:bodyPr wrap="square" rtlCol="0">
+            <a:spAutoFit/>
+          </a:bodyPr>
+          <a:lstStyle/>
+          <a:p>
+            <a:r>
+              <a:rPr lang="en-US" dirty="0" smtClean="0"/>
+              <a:t>Fits in Art-Board:</a:t>
+            </a:r>
+          </a:p>
+          <a:p>
+            <a:r>
+              <a:rPr lang="en-US" dirty="0" smtClean="0"/>
+              <a:t>No Collisions:</a:t>
+            </a:r>
+          </a:p>
+          <a:p>
+            <a:r>
+              <a:rPr lang="en-US" dirty="0" smtClean="0"/>
+              <a:t>Placed Items: Square, Trapezoid, Circle </a:t>
+            </a:r>
+            <a:endParaRPr lang="en-US" dirty="0"/>
+          </a:p>
+        </p:txBody>
+      </p:sp>
+      <p:sp>
+        <p:nvSpPr>
+          <p:cNvPr id="13" name="Oval 12"/>
+          <p:cNvSpPr/>
+          <p:nvPr/>
+        </p:nvSpPr>
+        <p:spPr>
+          <a:xfrm>
+            <a:off x="6208345" y="5812689"/>
+            <a:ext cx="185617" cy="185617"/>
+          </a:xfrm>
+          <a:prstGeom prst="ellipse">
+            <a:avLst/>
+          </a:prstGeom>
+        </p:spPr>
+        <p:style>
+          <a:lnRef idx="1">
+            <a:schemeClr val="accent2"/>
+          </a:lnRef>
+          <a:fillRef idx="3">
+            <a:schemeClr val="accent2"/>
+          </a:fillRef>
+          <a:effectRef idx="2">
+            <a:schemeClr val="accent2"/>
+          </a:effectRef>
+          <a:fontRef idx="minor">
+            <a:schemeClr val="lt1"/>
+          </a:fontRef>
+        </p:style>
+        <p:txBody>
+          <a:bodyPr rtlCol="0" anchor="ctr"/>
+          <a:lstStyle/>
+          <a:p>
+            <a:pPr algn="ctr"/>
+            <a:endParaRPr lang="en-US"/>
+          </a:p>
+        </p:txBody>
+      </p:sp>
+      <p:sp>
+        <p:nvSpPr>
+          <p:cNvPr id="16" name="Oval 15"/>
+          <p:cNvSpPr/>
+          <p:nvPr/>
+        </p:nvSpPr>
+        <p:spPr>
+          <a:xfrm>
+            <a:off x="6208345" y="5509844"/>
+            <a:ext cx="185617" cy="185617"/>
+          </a:xfrm>
+          <a:prstGeom prst="ellipse">
+            <a:avLst/>
+          </a:prstGeom>
+        </p:spPr>
+        <p:style>
+          <a:lnRef idx="1">
+            <a:schemeClr val="accent3"/>
+          </a:lnRef>
+          <a:fillRef idx="3">
+            <a:schemeClr val="accent3"/>
+          </a:fillRef>
+          <a:effectRef idx="2">
+            <a:schemeClr val="accent3"/>
+          </a:effectRef>
+          <a:fontRef idx="minor">
+            <a:schemeClr val="lt1"/>
+          </a:fontRef>
+        </p:style>
+        <p:txBody>
+          <a:bodyPr rtlCol="0" anchor="ctr"/>
+          <a:lstStyle/>
+          <a:p>
+            <a:pPr algn="ctr"/>
+            <a:endParaRPr lang="en-US"/>
           </a:p>
         </p:txBody>
       </p:sp>
@@ -8392,7 +9007,6 @@
               <a:rPr lang="en-US" sz="3200" dirty="0"/>
               <a:t>5</a:t>
             </a:r>
-            <a:endParaRPr lang="en-US" sz="3200" dirty="0"/>
           </a:p>
         </p:txBody>
       </p:sp>
@@ -8473,6 +9087,124 @@
               <a:t>1.0492</a:t>
             </a:r>
             <a:endParaRPr lang="en-US" dirty="0"/>
+          </a:p>
+        </p:txBody>
+      </p:sp>
+      <p:sp>
+        <p:nvSpPr>
+          <p:cNvPr id="12" name="TextBox 11"/>
+          <p:cNvSpPr txBox="1"/>
+          <p:nvPr/>
+        </p:nvSpPr>
+        <p:spPr>
+          <a:xfrm>
+            <a:off x="4391268" y="5421921"/>
+            <a:ext cx="4752731" cy="923330"/>
+          </a:xfrm>
+          <a:prstGeom prst="rect">
+            <a:avLst/>
+          </a:prstGeom>
+          <a:noFill/>
+        </p:spPr>
+        <p:txBody>
+          <a:bodyPr wrap="square" rtlCol="0">
+            <a:spAutoFit/>
+          </a:bodyPr>
+          <a:lstStyle/>
+          <a:p>
+            <a:r>
+              <a:rPr lang="en-US" dirty="0" smtClean="0"/>
+              <a:t>Fits in Art-Board:</a:t>
+            </a:r>
+          </a:p>
+          <a:p>
+            <a:r>
+              <a:rPr lang="en-US" dirty="0" smtClean="0"/>
+              <a:t>No Collisions:</a:t>
+            </a:r>
+          </a:p>
+          <a:p>
+            <a:r>
+              <a:rPr lang="en-US" dirty="0" smtClean="0"/>
+              <a:t>Placed Items: Square, Trapezoid, Circle </a:t>
+            </a:r>
+            <a:endParaRPr lang="en-US" dirty="0"/>
+          </a:p>
+        </p:txBody>
+      </p:sp>
+      <p:sp>
+        <p:nvSpPr>
+          <p:cNvPr id="13" name="Oval 12"/>
+          <p:cNvSpPr/>
+          <p:nvPr/>
+        </p:nvSpPr>
+        <p:spPr>
+          <a:xfrm>
+            <a:off x="6208345" y="5812689"/>
+            <a:ext cx="185617" cy="185617"/>
+          </a:xfrm>
+          <a:prstGeom prst="ellipse">
+            <a:avLst/>
+          </a:prstGeom>
+        </p:spPr>
+        <p:style>
+          <a:lnRef idx="1">
+            <a:schemeClr val="dk1"/>
+          </a:lnRef>
+          <a:fillRef idx="3">
+            <a:schemeClr val="dk1"/>
+          </a:fillRef>
+          <a:effectRef idx="2">
+            <a:schemeClr val="dk1"/>
+          </a:effectRef>
+          <a:fontRef idx="minor">
+            <a:schemeClr val="lt1"/>
+          </a:fontRef>
+        </p:style>
+        <p:txBody>
+          <a:bodyPr rtlCol="0" anchor="ctr"/>
+          <a:lstStyle/>
+          <a:p>
+            <a:pPr algn="ctr"/>
+            <a:endParaRPr lang="en-US"/>
+          </a:p>
+        </p:txBody>
+      </p:sp>
+      <p:sp>
+        <p:nvSpPr>
+          <p:cNvPr id="14" name="Oval 13"/>
+          <p:cNvSpPr/>
+          <p:nvPr/>
+        </p:nvSpPr>
+        <p:spPr>
+          <a:xfrm>
+            <a:off x="6208345" y="5509844"/>
+            <a:ext cx="185617" cy="185617"/>
+          </a:xfrm>
+          <a:prstGeom prst="ellipse">
+            <a:avLst/>
+          </a:prstGeom>
+        </p:spPr>
+        <p:style>
+          <a:lnRef idx="1">
+            <a:schemeClr val="accent2"/>
+          </a:lnRef>
+          <a:fillRef idx="3">
+            <a:schemeClr val="accent2"/>
+          </a:fillRef>
+          <a:effectRef idx="2">
+            <a:schemeClr val="accent2"/>
+          </a:effectRef>
+          <a:fontRef idx="minor">
+            <a:schemeClr val="lt1"/>
+          </a:fontRef>
+        </p:style>
+        <p:txBody>
+          <a:bodyPr rtlCol="0" anchor="ctr"/>
+          <a:lstStyle/>
+          <a:p>
+            <a:pPr algn="ctr"/>
+            <a:endParaRPr lang="en-US"/>
           </a:p>
         </p:txBody>
       </p:sp>
@@ -8762,11 +9494,6 @@
               </a:rPr>
               <a:t>6</a:t>
             </a:r>
-            <a:endParaRPr lang="en-US" sz="3200" dirty="0">
-              <a:solidFill>
-                <a:srgbClr val="000000"/>
-              </a:solidFill>
-            </a:endParaRPr>
           </a:p>
         </p:txBody>
       </p:sp>
@@ -8794,6 +9521,124 @@
           </a:fillRef>
           <a:effectRef idx="2">
             <a:schemeClr val="dk1"/>
+          </a:effectRef>
+          <a:fontRef idx="minor">
+            <a:schemeClr val="lt1"/>
+          </a:fontRef>
+        </p:style>
+        <p:txBody>
+          <a:bodyPr rtlCol="0" anchor="ctr"/>
+          <a:lstStyle/>
+          <a:p>
+            <a:pPr algn="ctr"/>
+            <a:endParaRPr lang="en-US"/>
+          </a:p>
+        </p:txBody>
+      </p:sp>
+      <p:sp>
+        <p:nvSpPr>
+          <p:cNvPr id="9" name="TextBox 8"/>
+          <p:cNvSpPr txBox="1"/>
+          <p:nvPr/>
+        </p:nvSpPr>
+        <p:spPr>
+          <a:xfrm>
+            <a:off x="4391268" y="5421921"/>
+            <a:ext cx="4977424" cy="923330"/>
+          </a:xfrm>
+          <a:prstGeom prst="rect">
+            <a:avLst/>
+          </a:prstGeom>
+          <a:noFill/>
+        </p:spPr>
+        <p:txBody>
+          <a:bodyPr wrap="square" rtlCol="0">
+            <a:spAutoFit/>
+          </a:bodyPr>
+          <a:lstStyle/>
+          <a:p>
+            <a:r>
+              <a:rPr lang="en-US" dirty="0" smtClean="0"/>
+              <a:t>Fits in Art-Board:</a:t>
+            </a:r>
+          </a:p>
+          <a:p>
+            <a:r>
+              <a:rPr lang="en-US" dirty="0" smtClean="0"/>
+              <a:t>No Collisions:</a:t>
+            </a:r>
+          </a:p>
+          <a:p>
+            <a:r>
+              <a:rPr lang="en-US" dirty="0" smtClean="0"/>
+              <a:t>Placed Items: Square, Trapezoid, Circle, Pentagon  </a:t>
+            </a:r>
+            <a:endParaRPr lang="en-US" dirty="0"/>
+          </a:p>
+        </p:txBody>
+      </p:sp>
+      <p:sp>
+        <p:nvSpPr>
+          <p:cNvPr id="12" name="Oval 11"/>
+          <p:cNvSpPr/>
+          <p:nvPr/>
+        </p:nvSpPr>
+        <p:spPr>
+          <a:xfrm>
+            <a:off x="6208345" y="5812689"/>
+            <a:ext cx="185617" cy="185617"/>
+          </a:xfrm>
+          <a:prstGeom prst="ellipse">
+            <a:avLst/>
+          </a:prstGeom>
+        </p:spPr>
+        <p:style>
+          <a:lnRef idx="1">
+            <a:schemeClr val="accent3"/>
+          </a:lnRef>
+          <a:fillRef idx="3">
+            <a:schemeClr val="accent3"/>
+          </a:fillRef>
+          <a:effectRef idx="2">
+            <a:schemeClr val="accent3"/>
+          </a:effectRef>
+          <a:fontRef idx="minor">
+            <a:schemeClr val="lt1"/>
+          </a:fontRef>
+        </p:style>
+        <p:txBody>
+          <a:bodyPr rtlCol="0" anchor="ctr"/>
+          <a:lstStyle/>
+          <a:p>
+            <a:pPr algn="ctr"/>
+            <a:endParaRPr lang="en-US"/>
+          </a:p>
+        </p:txBody>
+      </p:sp>
+      <p:sp>
+        <p:nvSpPr>
+          <p:cNvPr id="13" name="Oval 12"/>
+          <p:cNvSpPr/>
+          <p:nvPr/>
+        </p:nvSpPr>
+        <p:spPr>
+          <a:xfrm>
+            <a:off x="6208345" y="5509844"/>
+            <a:ext cx="185617" cy="185617"/>
+          </a:xfrm>
+          <a:prstGeom prst="ellipse">
+            <a:avLst/>
+          </a:prstGeom>
+        </p:spPr>
+        <p:style>
+          <a:lnRef idx="1">
+            <a:schemeClr val="accent3"/>
+          </a:lnRef>
+          <a:fillRef idx="3">
+            <a:schemeClr val="accent3"/>
+          </a:fillRef>
+          <a:effectRef idx="2">
+            <a:schemeClr val="accent3"/>
           </a:effectRef>
           <a:fontRef idx="minor">
             <a:schemeClr val="lt1"/>
@@ -9091,6 +9936,124 @@
               <a:latin typeface="Helvetica"/>
               <a:cs typeface="Helvetica"/>
             </a:endParaRPr>
+          </a:p>
+        </p:txBody>
+      </p:sp>
+      <p:sp>
+        <p:nvSpPr>
+          <p:cNvPr id="8" name="TextBox 7"/>
+          <p:cNvSpPr txBox="1"/>
+          <p:nvPr/>
+        </p:nvSpPr>
+        <p:spPr>
+          <a:xfrm>
+            <a:off x="4391268" y="5421921"/>
+            <a:ext cx="4977424" cy="923330"/>
+          </a:xfrm>
+          <a:prstGeom prst="rect">
+            <a:avLst/>
+          </a:prstGeom>
+          <a:noFill/>
+        </p:spPr>
+        <p:txBody>
+          <a:bodyPr wrap="square" rtlCol="0">
+            <a:spAutoFit/>
+          </a:bodyPr>
+          <a:lstStyle/>
+          <a:p>
+            <a:r>
+              <a:rPr lang="en-US" dirty="0" smtClean="0"/>
+              <a:t>Fits in Art-Board:</a:t>
+            </a:r>
+          </a:p>
+          <a:p>
+            <a:r>
+              <a:rPr lang="en-US" dirty="0" smtClean="0"/>
+              <a:t>No Collisions:</a:t>
+            </a:r>
+          </a:p>
+          <a:p>
+            <a:r>
+              <a:rPr lang="en-US" dirty="0" smtClean="0"/>
+              <a:t>Placed Items: Square, Trapezoid, Circle, Pentagon  </a:t>
+            </a:r>
+            <a:endParaRPr lang="en-US" dirty="0"/>
+          </a:p>
+        </p:txBody>
+      </p:sp>
+      <p:sp>
+        <p:nvSpPr>
+          <p:cNvPr id="9" name="Oval 8"/>
+          <p:cNvSpPr/>
+          <p:nvPr/>
+        </p:nvSpPr>
+        <p:spPr>
+          <a:xfrm>
+            <a:off x="6208345" y="5812689"/>
+            <a:ext cx="185617" cy="185617"/>
+          </a:xfrm>
+          <a:prstGeom prst="ellipse">
+            <a:avLst/>
+          </a:prstGeom>
+        </p:spPr>
+        <p:style>
+          <a:lnRef idx="1">
+            <a:schemeClr val="dk1"/>
+          </a:lnRef>
+          <a:fillRef idx="3">
+            <a:schemeClr val="dk1"/>
+          </a:fillRef>
+          <a:effectRef idx="2">
+            <a:schemeClr val="dk1"/>
+          </a:effectRef>
+          <a:fontRef idx="minor">
+            <a:schemeClr val="lt1"/>
+          </a:fontRef>
+        </p:style>
+        <p:txBody>
+          <a:bodyPr rtlCol="0" anchor="ctr"/>
+          <a:lstStyle/>
+          <a:p>
+            <a:pPr algn="ctr"/>
+            <a:endParaRPr lang="en-US"/>
+          </a:p>
+        </p:txBody>
+      </p:sp>
+      <p:sp>
+        <p:nvSpPr>
+          <p:cNvPr id="13" name="Oval 12"/>
+          <p:cNvSpPr/>
+          <p:nvPr/>
+        </p:nvSpPr>
+        <p:spPr>
+          <a:xfrm>
+            <a:off x="6208345" y="5509844"/>
+            <a:ext cx="185617" cy="185617"/>
+          </a:xfrm>
+          <a:prstGeom prst="ellipse">
+            <a:avLst/>
+          </a:prstGeom>
+        </p:spPr>
+        <p:style>
+          <a:lnRef idx="1">
+            <a:schemeClr val="dk1"/>
+          </a:lnRef>
+          <a:fillRef idx="3">
+            <a:schemeClr val="dk1"/>
+          </a:fillRef>
+          <a:effectRef idx="2">
+            <a:schemeClr val="dk1"/>
+          </a:effectRef>
+          <a:fontRef idx="minor">
+            <a:schemeClr val="lt1"/>
+          </a:fontRef>
+        </p:style>
+        <p:txBody>
+          <a:bodyPr rtlCol="0" anchor="ctr"/>
+          <a:lstStyle/>
+          <a:p>
+            <a:pPr algn="ctr"/>
+            <a:endParaRPr lang="en-US"/>
           </a:p>
         </p:txBody>
       </p:sp>
@@ -10791,6 +11754,48 @@
           </a:p>
         </p:txBody>
       </p:sp>
+      <p:sp>
+        <p:nvSpPr>
+          <p:cNvPr id="2" name="TextBox 1"/>
+          <p:cNvSpPr txBox="1"/>
+          <p:nvPr/>
+        </p:nvSpPr>
+        <p:spPr>
+          <a:xfrm>
+            <a:off x="4391269" y="5421921"/>
+            <a:ext cx="2286000" cy="923330"/>
+          </a:xfrm>
+          <a:prstGeom prst="rect">
+            <a:avLst/>
+          </a:prstGeom>
+          <a:noFill/>
+        </p:spPr>
+        <p:txBody>
+          <a:bodyPr wrap="square" rtlCol="0">
+            <a:spAutoFit/>
+          </a:bodyPr>
+          <a:lstStyle/>
+          <a:p>
+            <a:r>
+              <a:rPr lang="en-US" dirty="0" smtClean="0"/>
+              <a:t>Fits in Art-Board:</a:t>
+            </a:r>
+          </a:p>
+          <a:p>
+            <a:r>
+              <a:rPr lang="en-US" dirty="0" smtClean="0"/>
+              <a:t>No Collisions:</a:t>
+            </a:r>
+          </a:p>
+          <a:p>
+            <a:r>
+              <a:rPr lang="en-US" dirty="0" smtClean="0"/>
+              <a:t>Placed Items:</a:t>
+            </a:r>
+            <a:endParaRPr lang="en-US" dirty="0"/>
+          </a:p>
+        </p:txBody>
+      </p:sp>
     </p:spTree>
     <p:extLst>
       <p:ext uri="{BB962C8B-B14F-4D97-AF65-F5344CB8AC3E}">
@@ -11135,6 +12140,124 @@
           </a:p>
         </p:txBody>
       </p:sp>
+      <p:sp>
+        <p:nvSpPr>
+          <p:cNvPr id="11" name="TextBox 10"/>
+          <p:cNvSpPr txBox="1"/>
+          <p:nvPr/>
+        </p:nvSpPr>
+        <p:spPr>
+          <a:xfrm>
+            <a:off x="4391268" y="5421921"/>
+            <a:ext cx="4752731" cy="923330"/>
+          </a:xfrm>
+          <a:prstGeom prst="rect">
+            <a:avLst/>
+          </a:prstGeom>
+          <a:noFill/>
+        </p:spPr>
+        <p:txBody>
+          <a:bodyPr wrap="square" rtlCol="0">
+            <a:spAutoFit/>
+          </a:bodyPr>
+          <a:lstStyle/>
+          <a:p>
+            <a:r>
+              <a:rPr lang="en-US" dirty="0" smtClean="0"/>
+              <a:t>Fits in Art-Board:</a:t>
+            </a:r>
+          </a:p>
+          <a:p>
+            <a:r>
+              <a:rPr lang="en-US" dirty="0" smtClean="0"/>
+              <a:t>No Collisions:</a:t>
+            </a:r>
+          </a:p>
+          <a:p>
+            <a:r>
+              <a:rPr lang="en-US" dirty="0" smtClean="0"/>
+              <a:t>Placed Items: Square,</a:t>
+            </a:r>
+            <a:endParaRPr lang="en-US" dirty="0"/>
+          </a:p>
+        </p:txBody>
+      </p:sp>
+      <p:sp>
+        <p:nvSpPr>
+          <p:cNvPr id="13" name="Oval 12"/>
+          <p:cNvSpPr/>
+          <p:nvPr/>
+        </p:nvSpPr>
+        <p:spPr>
+          <a:xfrm>
+            <a:off x="6208345" y="5812689"/>
+            <a:ext cx="185617" cy="185617"/>
+          </a:xfrm>
+          <a:prstGeom prst="ellipse">
+            <a:avLst/>
+          </a:prstGeom>
+        </p:spPr>
+        <p:style>
+          <a:lnRef idx="1">
+            <a:schemeClr val="accent3"/>
+          </a:lnRef>
+          <a:fillRef idx="3">
+            <a:schemeClr val="accent3"/>
+          </a:fillRef>
+          <a:effectRef idx="2">
+            <a:schemeClr val="accent3"/>
+          </a:effectRef>
+          <a:fontRef idx="minor">
+            <a:schemeClr val="lt1"/>
+          </a:fontRef>
+        </p:style>
+        <p:txBody>
+          <a:bodyPr rtlCol="0" anchor="ctr"/>
+          <a:lstStyle/>
+          <a:p>
+            <a:pPr algn="ctr"/>
+            <a:endParaRPr lang="en-US"/>
+          </a:p>
+        </p:txBody>
+      </p:sp>
+      <p:sp>
+        <p:nvSpPr>
+          <p:cNvPr id="14" name="Oval 13"/>
+          <p:cNvSpPr/>
+          <p:nvPr/>
+        </p:nvSpPr>
+        <p:spPr>
+          <a:xfrm>
+            <a:off x="6208345" y="5509844"/>
+            <a:ext cx="185617" cy="185617"/>
+          </a:xfrm>
+          <a:prstGeom prst="ellipse">
+            <a:avLst/>
+          </a:prstGeom>
+        </p:spPr>
+        <p:style>
+          <a:lnRef idx="1">
+            <a:schemeClr val="accent3"/>
+          </a:lnRef>
+          <a:fillRef idx="3">
+            <a:schemeClr val="accent3"/>
+          </a:fillRef>
+          <a:effectRef idx="2">
+            <a:schemeClr val="accent3"/>
+          </a:effectRef>
+          <a:fontRef idx="minor">
+            <a:schemeClr val="lt1"/>
+          </a:fontRef>
+        </p:style>
+        <p:txBody>
+          <a:bodyPr rtlCol="0" anchor="ctr"/>
+          <a:lstStyle/>
+          <a:p>
+            <a:pPr algn="ctr"/>
+            <a:endParaRPr lang="en-US"/>
+          </a:p>
+        </p:txBody>
+      </p:sp>
     </p:spTree>
     <p:extLst>
       <p:ext uri="{BB962C8B-B14F-4D97-AF65-F5344CB8AC3E}">
@@ -11563,6 +12686,124 @@
           </a:p>
         </p:txBody>
       </p:sp>
+      <p:sp>
+        <p:nvSpPr>
+          <p:cNvPr id="12" name="TextBox 11"/>
+          <p:cNvSpPr txBox="1"/>
+          <p:nvPr/>
+        </p:nvSpPr>
+        <p:spPr>
+          <a:xfrm>
+            <a:off x="4391268" y="5421921"/>
+            <a:ext cx="4752731" cy="923330"/>
+          </a:xfrm>
+          <a:prstGeom prst="rect">
+            <a:avLst/>
+          </a:prstGeom>
+          <a:noFill/>
+        </p:spPr>
+        <p:txBody>
+          <a:bodyPr wrap="square" rtlCol="0">
+            <a:spAutoFit/>
+          </a:bodyPr>
+          <a:lstStyle/>
+          <a:p>
+            <a:r>
+              <a:rPr lang="en-US" dirty="0" smtClean="0"/>
+              <a:t>Fits in Art-Board:</a:t>
+            </a:r>
+          </a:p>
+          <a:p>
+            <a:r>
+              <a:rPr lang="en-US" dirty="0" smtClean="0"/>
+              <a:t>No Collisions:</a:t>
+            </a:r>
+          </a:p>
+          <a:p>
+            <a:r>
+              <a:rPr lang="en-US" dirty="0" smtClean="0"/>
+              <a:t>Placed Items: Square,</a:t>
+            </a:r>
+            <a:endParaRPr lang="en-US" dirty="0"/>
+          </a:p>
+        </p:txBody>
+      </p:sp>
+      <p:sp>
+        <p:nvSpPr>
+          <p:cNvPr id="17" name="Oval 16"/>
+          <p:cNvSpPr/>
+          <p:nvPr/>
+        </p:nvSpPr>
+        <p:spPr>
+          <a:xfrm>
+            <a:off x="6208345" y="5812689"/>
+            <a:ext cx="185617" cy="185617"/>
+          </a:xfrm>
+          <a:prstGeom prst="ellipse">
+            <a:avLst/>
+          </a:prstGeom>
+        </p:spPr>
+        <p:style>
+          <a:lnRef idx="1">
+            <a:schemeClr val="dk1"/>
+          </a:lnRef>
+          <a:fillRef idx="3">
+            <a:schemeClr val="dk1"/>
+          </a:fillRef>
+          <a:effectRef idx="2">
+            <a:schemeClr val="dk1"/>
+          </a:effectRef>
+          <a:fontRef idx="minor">
+            <a:schemeClr val="lt1"/>
+          </a:fontRef>
+        </p:style>
+        <p:txBody>
+          <a:bodyPr rtlCol="0" anchor="ctr"/>
+          <a:lstStyle/>
+          <a:p>
+            <a:pPr algn="ctr"/>
+            <a:endParaRPr lang="en-US"/>
+          </a:p>
+        </p:txBody>
+      </p:sp>
+      <p:sp>
+        <p:nvSpPr>
+          <p:cNvPr id="18" name="Oval 17"/>
+          <p:cNvSpPr/>
+          <p:nvPr/>
+        </p:nvSpPr>
+        <p:spPr>
+          <a:xfrm>
+            <a:off x="6208345" y="5509844"/>
+            <a:ext cx="185617" cy="185617"/>
+          </a:xfrm>
+          <a:prstGeom prst="ellipse">
+            <a:avLst/>
+          </a:prstGeom>
+        </p:spPr>
+        <p:style>
+          <a:lnRef idx="1">
+            <a:schemeClr val="accent2"/>
+          </a:lnRef>
+          <a:fillRef idx="3">
+            <a:schemeClr val="accent2"/>
+          </a:fillRef>
+          <a:effectRef idx="2">
+            <a:schemeClr val="accent2"/>
+          </a:effectRef>
+          <a:fontRef idx="minor">
+            <a:schemeClr val="lt1"/>
+          </a:fontRef>
+        </p:style>
+        <p:txBody>
+          <a:bodyPr rtlCol="0" anchor="ctr"/>
+          <a:lstStyle/>
+          <a:p>
+            <a:pPr algn="ctr"/>
+            <a:endParaRPr lang="en-US"/>
+          </a:p>
+        </p:txBody>
+      </p:sp>
     </p:spTree>
     <p:extLst>
       <p:ext uri="{BB962C8B-B14F-4D97-AF65-F5344CB8AC3E}">
@@ -11773,11 +13014,6 @@
               </a:rPr>
               <a:t>2</a:t>
             </a:r>
-            <a:endParaRPr lang="en-US" sz="3200" dirty="0">
-              <a:solidFill>
-                <a:schemeClr val="tx1"/>
-              </a:solidFill>
-            </a:endParaRPr>
           </a:p>
         </p:txBody>
       </p:sp>
@@ -11900,6 +13136,124 @@
               <a:t>1.0492</a:t>
             </a:r>
             <a:endParaRPr lang="en-US" dirty="0"/>
+          </a:p>
+        </p:txBody>
+      </p:sp>
+      <p:sp>
+        <p:nvSpPr>
+          <p:cNvPr id="9" name="TextBox 8"/>
+          <p:cNvSpPr txBox="1"/>
+          <p:nvPr/>
+        </p:nvSpPr>
+        <p:spPr>
+          <a:xfrm>
+            <a:off x="4391268" y="5421921"/>
+            <a:ext cx="4752731" cy="923330"/>
+          </a:xfrm>
+          <a:prstGeom prst="rect">
+            <a:avLst/>
+          </a:prstGeom>
+          <a:noFill/>
+        </p:spPr>
+        <p:txBody>
+          <a:bodyPr wrap="square" rtlCol="0">
+            <a:spAutoFit/>
+          </a:bodyPr>
+          <a:lstStyle/>
+          <a:p>
+            <a:r>
+              <a:rPr lang="en-US" dirty="0" smtClean="0"/>
+              <a:t>Fits in Art-Board:</a:t>
+            </a:r>
+          </a:p>
+          <a:p>
+            <a:r>
+              <a:rPr lang="en-US" dirty="0" smtClean="0"/>
+              <a:t>No Collisions:</a:t>
+            </a:r>
+          </a:p>
+          <a:p>
+            <a:r>
+              <a:rPr lang="en-US" dirty="0" smtClean="0"/>
+              <a:t>Placed Items: Square, Trapezoid, </a:t>
+            </a:r>
+            <a:endParaRPr lang="en-US" dirty="0"/>
+          </a:p>
+        </p:txBody>
+      </p:sp>
+      <p:sp>
+        <p:nvSpPr>
+          <p:cNvPr id="12" name="Oval 11"/>
+          <p:cNvSpPr/>
+          <p:nvPr/>
+        </p:nvSpPr>
+        <p:spPr>
+          <a:xfrm>
+            <a:off x="6208345" y="5812689"/>
+            <a:ext cx="185617" cy="185617"/>
+          </a:xfrm>
+          <a:prstGeom prst="ellipse">
+            <a:avLst/>
+          </a:prstGeom>
+        </p:spPr>
+        <p:style>
+          <a:lnRef idx="1">
+            <a:schemeClr val="accent3"/>
+          </a:lnRef>
+          <a:fillRef idx="3">
+            <a:schemeClr val="accent3"/>
+          </a:fillRef>
+          <a:effectRef idx="2">
+            <a:schemeClr val="accent3"/>
+          </a:effectRef>
+          <a:fontRef idx="minor">
+            <a:schemeClr val="lt1"/>
+          </a:fontRef>
+        </p:style>
+        <p:txBody>
+          <a:bodyPr rtlCol="0" anchor="ctr"/>
+          <a:lstStyle/>
+          <a:p>
+            <a:pPr algn="ctr"/>
+            <a:endParaRPr lang="en-US"/>
+          </a:p>
+        </p:txBody>
+      </p:sp>
+      <p:sp>
+        <p:nvSpPr>
+          <p:cNvPr id="13" name="Oval 12"/>
+          <p:cNvSpPr/>
+          <p:nvPr/>
+        </p:nvSpPr>
+        <p:spPr>
+          <a:xfrm>
+            <a:off x="6208345" y="5509844"/>
+            <a:ext cx="185617" cy="185617"/>
+          </a:xfrm>
+          <a:prstGeom prst="ellipse">
+            <a:avLst/>
+          </a:prstGeom>
+        </p:spPr>
+        <p:style>
+          <a:lnRef idx="1">
+            <a:schemeClr val="accent3"/>
+          </a:lnRef>
+          <a:fillRef idx="3">
+            <a:schemeClr val="accent3"/>
+          </a:fillRef>
+          <a:effectRef idx="2">
+            <a:schemeClr val="accent3"/>
+          </a:effectRef>
+          <a:fontRef idx="minor">
+            <a:schemeClr val="lt1"/>
+          </a:fontRef>
+        </p:style>
+        <p:txBody>
+          <a:bodyPr rtlCol="0" anchor="ctr"/>
+          <a:lstStyle/>
+          <a:p>
+            <a:pPr algn="ctr"/>
+            <a:endParaRPr lang="en-US"/>
           </a:p>
         </p:txBody>
       </p:sp>
@@ -12292,6 +13646,124 @@
               <a:t>1.0492</a:t>
             </a:r>
             <a:endParaRPr lang="en-US" dirty="0"/>
+          </a:p>
+        </p:txBody>
+      </p:sp>
+      <p:sp>
+        <p:nvSpPr>
+          <p:cNvPr id="14" name="TextBox 13"/>
+          <p:cNvSpPr txBox="1"/>
+          <p:nvPr/>
+        </p:nvSpPr>
+        <p:spPr>
+          <a:xfrm>
+            <a:off x="4391268" y="5421921"/>
+            <a:ext cx="4752731" cy="923330"/>
+          </a:xfrm>
+          <a:prstGeom prst="rect">
+            <a:avLst/>
+          </a:prstGeom>
+          <a:noFill/>
+        </p:spPr>
+        <p:txBody>
+          <a:bodyPr wrap="square" rtlCol="0">
+            <a:spAutoFit/>
+          </a:bodyPr>
+          <a:lstStyle/>
+          <a:p>
+            <a:r>
+              <a:rPr lang="en-US" dirty="0" smtClean="0"/>
+              <a:t>Fits in Art-Board:</a:t>
+            </a:r>
+          </a:p>
+          <a:p>
+            <a:r>
+              <a:rPr lang="en-US" dirty="0" smtClean="0"/>
+              <a:t>No Collisions:</a:t>
+            </a:r>
+          </a:p>
+          <a:p>
+            <a:r>
+              <a:rPr lang="en-US" dirty="0" smtClean="0"/>
+              <a:t>Placed Items: Square, Trapezoid, </a:t>
+            </a:r>
+            <a:endParaRPr lang="en-US" dirty="0"/>
+          </a:p>
+        </p:txBody>
+      </p:sp>
+      <p:sp>
+        <p:nvSpPr>
+          <p:cNvPr id="15" name="Oval 14"/>
+          <p:cNvSpPr/>
+          <p:nvPr/>
+        </p:nvSpPr>
+        <p:spPr>
+          <a:xfrm>
+            <a:off x="6208345" y="5812689"/>
+            <a:ext cx="185617" cy="185617"/>
+          </a:xfrm>
+          <a:prstGeom prst="ellipse">
+            <a:avLst/>
+          </a:prstGeom>
+        </p:spPr>
+        <p:style>
+          <a:lnRef idx="1">
+            <a:schemeClr val="dk1"/>
+          </a:lnRef>
+          <a:fillRef idx="3">
+            <a:schemeClr val="dk1"/>
+          </a:fillRef>
+          <a:effectRef idx="2">
+            <a:schemeClr val="dk1"/>
+          </a:effectRef>
+          <a:fontRef idx="minor">
+            <a:schemeClr val="lt1"/>
+          </a:fontRef>
+        </p:style>
+        <p:txBody>
+          <a:bodyPr rtlCol="0" anchor="ctr"/>
+          <a:lstStyle/>
+          <a:p>
+            <a:pPr algn="ctr"/>
+            <a:endParaRPr lang="en-US"/>
+          </a:p>
+        </p:txBody>
+      </p:sp>
+      <p:sp>
+        <p:nvSpPr>
+          <p:cNvPr id="17" name="Oval 16"/>
+          <p:cNvSpPr/>
+          <p:nvPr/>
+        </p:nvSpPr>
+        <p:spPr>
+          <a:xfrm>
+            <a:off x="6208345" y="5509844"/>
+            <a:ext cx="185617" cy="185617"/>
+          </a:xfrm>
+          <a:prstGeom prst="ellipse">
+            <a:avLst/>
+          </a:prstGeom>
+        </p:spPr>
+        <p:style>
+          <a:lnRef idx="1">
+            <a:schemeClr val="accent2"/>
+          </a:lnRef>
+          <a:fillRef idx="3">
+            <a:schemeClr val="accent2"/>
+          </a:fillRef>
+          <a:effectRef idx="2">
+            <a:schemeClr val="accent2"/>
+          </a:effectRef>
+          <a:fontRef idx="minor">
+            <a:schemeClr val="lt1"/>
+          </a:fontRef>
+        </p:style>
+        <p:txBody>
+          <a:bodyPr rtlCol="0" anchor="ctr"/>
+          <a:lstStyle/>
+          <a:p>
+            <a:pPr algn="ctr"/>
+            <a:endParaRPr lang="en-US"/>
           </a:p>
         </p:txBody>
       </p:sp>

</xml_diff>

<commit_message>
added some final closing thoughts
</commit_message>
<xml_diff>
--- a/SantaCode_2014_StJohn.pptx
+++ b/SantaCode_2014_StJohn.pptx
@@ -22,6 +22,7 @@
     <p:sldId id="269" r:id="rId16"/>
     <p:sldId id="270" r:id="rId17"/>
     <p:sldId id="271" r:id="rId18"/>
+    <p:sldId id="273" r:id="rId19"/>
   </p:sldIdLst>
   <p:sldSz cx="9144000" cy="6858000" type="screen4x3"/>
   <p:notesSz cx="6858000" cy="9144000"/>
@@ -10070,6 +10071,92 @@
 </p:sld>
 </file>
 
+<file path=ppt/slides/slide18.xml><?xml version="1.0" encoding="utf-8"?>
+<p:sld xmlns:a="http://schemas.openxmlformats.org/drawingml/2006/main" xmlns:r="http://schemas.openxmlformats.org/officeDocument/2006/relationships" xmlns:p="http://schemas.openxmlformats.org/presentationml/2006/main">
+  <p:cSld>
+    <p:spTree>
+      <p:nvGrpSpPr>
+        <p:cNvPr id="1" name=""/>
+        <p:cNvGrpSpPr/>
+        <p:nvPr/>
+      </p:nvGrpSpPr>
+      <p:grpSpPr>
+        <a:xfrm>
+          <a:off x="0" y="0"/>
+          <a:ext cx="0" cy="0"/>
+          <a:chOff x="0" y="0"/>
+          <a:chExt cx="0" cy="0"/>
+        </a:xfrm>
+      </p:grpSpPr>
+      <p:sp>
+        <p:nvSpPr>
+          <p:cNvPr id="2" name="Title 1"/>
+          <p:cNvSpPr>
+            <a:spLocks noGrp="1"/>
+          </p:cNvSpPr>
+          <p:nvPr>
+            <p:ph type="title"/>
+          </p:nvPr>
+        </p:nvSpPr>
+        <p:spPr/>
+        <p:txBody>
+          <a:bodyPr/>
+          <a:lstStyle/>
+          <a:p>
+            <a:r>
+              <a:rPr lang="en-US" dirty="0" smtClean="0"/>
+              <a:t>Challenges to overcome</a:t>
+            </a:r>
+            <a:endParaRPr lang="en-US" dirty="0"/>
+          </a:p>
+        </p:txBody>
+      </p:sp>
+      <p:sp>
+        <p:nvSpPr>
+          <p:cNvPr id="3" name="Content Placeholder 2"/>
+          <p:cNvSpPr>
+            <a:spLocks noGrp="1"/>
+          </p:cNvSpPr>
+          <p:nvPr>
+            <p:ph idx="1"/>
+          </p:nvPr>
+        </p:nvSpPr>
+        <p:spPr/>
+        <p:txBody>
+          <a:bodyPr/>
+          <a:lstStyle/>
+          <a:p>
+            <a:r>
+              <a:rPr lang="en-US" dirty="0" smtClean="0"/>
+              <a:t>Still need to create working proof of reconstructing the sprite sheet in Flash.</a:t>
+            </a:r>
+          </a:p>
+          <a:p>
+            <a:r>
+              <a:rPr lang="en-US" dirty="0" smtClean="0"/>
+              <a:t>How to handle exporting sprite sheets at different resolutions and their reconstruction </a:t>
+            </a:r>
+            <a:r>
+              <a:rPr lang="en-US" smtClean="0"/>
+              <a:t>in flash</a:t>
+            </a:r>
+            <a:endParaRPr lang="en-US" dirty="0"/>
+          </a:p>
+        </p:txBody>
+      </p:sp>
+    </p:spTree>
+    <p:extLst>
+      <p:ext uri="{BB962C8B-B14F-4D97-AF65-F5344CB8AC3E}">
+        <p14:creationId xmlns:p14="http://schemas.microsoft.com/office/powerpoint/2010/main" val="2104941252"/>
+      </p:ext>
+    </p:extLst>
+  </p:cSld>
+  <p:clrMapOvr>
+    <a:masterClrMapping/>
+  </p:clrMapOvr>
+</p:sld>
+</file>
+
 <file path=ppt/slides/slide2.xml><?xml version="1.0" encoding="utf-8"?>
 <p:sld xmlns:a="http://schemas.openxmlformats.org/drawingml/2006/main" xmlns:r="http://schemas.openxmlformats.org/officeDocument/2006/relationships" xmlns:p="http://schemas.openxmlformats.org/presentationml/2006/main">
   <p:cSld>

</xml_diff>